<commit_message>
Removes a few charts and updates the title slide.
</commit_message>
<xml_diff>
--- a/Presentations/2024-07-25/title-slide.pptx
+++ b/Presentations/2024-07-25/title-slide.pptx
@@ -214,7 +214,7 @@
           </a:lstStyle>
           <a:p>
             <a:fld id="{935E4EA1-A99D-B048-BA0C-79C029FED16D}" type="datetimeFigureOut">
-              <a:t>7/10/2024</a:t>
+              <a:t>7/24/2024</a:t>
             </a:fld>
             <a:endParaRPr lang="en-US"/>
           </a:p>
@@ -378,7 +378,7 @@
           <a:p>
             <a:fld id="{29341F68-DADF-2547-A6B4-F95624CB91F3}" type="datetimeFigureOut">
               <a:rPr lang="en-US" smtClean="0"/>
-              <a:t>7/10/2024</a:t>
+              <a:t>7/24/2024</a:t>
             </a:fld>
             <a:endParaRPr lang="en-US"/>
           </a:p>
@@ -5537,7 +5537,13 @@
           <p:cNvGraphicFramePr>
             <a:graphicFrameLocks noGrp="1"/>
           </p:cNvGraphicFramePr>
-          <p:nvPr/>
+          <p:nvPr>
+            <p:extLst>
+              <p:ext uri="{D42A27DB-BD31-4B8C-83A1-F6EECF244321}">
+                <p14:modId xmlns:p14="http://schemas.microsoft.com/office/powerpoint/2010/main" val="3305216781"/>
+              </p:ext>
+            </p:extLst>
+          </p:nvPr>
         </p:nvGraphicFramePr>
         <p:xfrm>
           <a:off x="820717" y="3593372"/>
@@ -5726,6 +5732,23 @@
                         <a:defRPr/>
                       </a:pPr>
                       <a:r>
+                        <a:rPr kumimoji="0" lang="en-US" sz="1600" b="1" i="0" u="none" strike="noStrike" kern="1200" cap="none" spc="0" normalizeH="0" baseline="0" noProof="0">
+                          <a:ln>
+                            <a:noFill/>
+                          </a:ln>
+                          <a:solidFill>
+                            <a:srgbClr val="139DEC"/>
+                          </a:solidFill>
+                          <a:effectLst/>
+                          <a:uLnTx/>
+                          <a:uFillTx/>
+                          <a:latin typeface="+mn-lt"/>
+                          <a:ea typeface="+mn-ea"/>
+                          <a:cs typeface="+mn-cs"/>
+                        </a:rPr>
+                        <a:t>25 </a:t>
+                      </a:r>
+                      <a:r>
                         <a:rPr kumimoji="0" lang="en-US" sz="1600" b="1" i="0" u="none" strike="noStrike" kern="1200" cap="none" spc="0" normalizeH="0" baseline="0" noProof="0" dirty="0">
                           <a:ln>
                             <a:noFill/>
@@ -5740,7 +5763,7 @@
                           <a:ea typeface="+mn-ea"/>
                           <a:cs typeface="+mn-cs"/>
                         </a:rPr>
-                        <a:t>11 July 2024</a:t>
+                        <a:t>July 2024</a:t>
                       </a:r>
                     </a:p>
                   </a:txBody>

</xml_diff>